<commit_message>
adding abstract resources and editing meeting plan
</commit_message>
<xml_diff>
--- a/resources/abstracts/how_to_write_an_abstract.pptx
+++ b/resources/abstracts/how_to_write_an_abstract.pptx
@@ -10,7 +10,9 @@
     <p:sldId id="258" r:id="rId4"/>
     <p:sldId id="259" r:id="rId5"/>
     <p:sldId id="260" r:id="rId6"/>
-    <p:sldId id="261" r:id="rId7"/>
+    <p:sldId id="263" r:id="rId7"/>
+    <p:sldId id="262" r:id="rId8"/>
+    <p:sldId id="261" r:id="rId9"/>
   </p:sldIdLst>
   <p:sldSz cx="12192000" cy="6858000"/>
   <p:notesSz cx="6858000" cy="9144000"/>
@@ -109,6 +111,11 @@
       </a:defRPr>
     </a:lvl9pPr>
   </p:defaultTextStyle>
+  <p:extLst>
+    <p:ext uri="{EFAFB233-063F-42B5-8137-9DF3F51BA10A}">
+      <p15:sldGuideLst xmlns:p15="http://schemas.microsoft.com/office/powerpoint/2012/main"/>
+    </p:ext>
+  </p:extLst>
 </p:presentation>
 </file>
 
@@ -350,7 +357,7 @@
           <a:p>
             <a:fld id="{ED291B17-9318-49DB-B28B-6E5994AE9581}" type="datetime1">
               <a:rPr lang="en-US" smtClean="0"/>
-              <a:t>6/16/2020</a:t>
+              <a:t>6/18/2020</a:t>
             </a:fld>
             <a:endParaRPr lang="en-US" dirty="0"/>
           </a:p>
@@ -553,7 +560,7 @@
           <a:p>
             <a:fld id="{2CED4963-E985-44C4-B8C4-FDD613B7C2F8}" type="datetime1">
               <a:rPr lang="en-US" smtClean="0"/>
-              <a:t>6/16/2020</a:t>
+              <a:t>6/18/2020</a:t>
             </a:fld>
             <a:endParaRPr lang="en-US" dirty="0"/>
           </a:p>
@@ -915,7 +922,7 @@
           <a:p>
             <a:fld id="{ED291B17-9318-49DB-B28B-6E5994AE9581}" type="datetime1">
               <a:rPr lang="en-US" smtClean="0"/>
-              <a:t>6/16/2020</a:t>
+              <a:t>6/18/2020</a:t>
             </a:fld>
             <a:endParaRPr lang="en-US" dirty="0"/>
           </a:p>
@@ -1113,7 +1120,7 @@
           <a:p>
             <a:fld id="{78DD82B9-B8EE-4375-B6FF-88FA6ABB15D9}" type="datetime1">
               <a:rPr lang="en-US" smtClean="0"/>
-              <a:t>6/16/2020</a:t>
+              <a:t>6/18/2020</a:t>
             </a:fld>
             <a:endParaRPr lang="en-US" dirty="0"/>
           </a:p>
@@ -1425,7 +1432,7 @@
           <a:p>
             <a:fld id="{B2497495-0637-405E-AE64-5CC7506D51F5}" type="datetime1">
               <a:rPr lang="en-US" smtClean="0"/>
-              <a:t>6/16/2020</a:t>
+              <a:t>6/18/2020</a:t>
             </a:fld>
             <a:endParaRPr lang="en-US" dirty="0"/>
           </a:p>
@@ -1678,7 +1685,7 @@
           <a:p>
             <a:fld id="{7BFFD690-9426-415D-8B65-26881E07B2D4}" type="datetime1">
               <a:rPr lang="en-US" smtClean="0"/>
-              <a:t>6/16/2020</a:t>
+              <a:t>6/18/2020</a:t>
             </a:fld>
             <a:endParaRPr lang="en-US" dirty="0"/>
           </a:p>
@@ -2100,7 +2107,7 @@
           <a:p>
             <a:fld id="{04C4989A-474C-40DE-95B9-011C28B71673}" type="datetime1">
               <a:rPr lang="en-US" smtClean="0"/>
-              <a:t>6/16/2020</a:t>
+              <a:t>6/18/2020</a:t>
             </a:fld>
             <a:endParaRPr lang="en-US" dirty="0"/>
           </a:p>
@@ -2223,7 +2230,7 @@
           <a:p>
             <a:fld id="{5DB4ED54-5B5E-4A04-93D3-5772E3CE3818}" type="datetime1">
               <a:rPr lang="en-US" smtClean="0"/>
-              <a:t>6/16/2020</a:t>
+              <a:t>6/18/2020</a:t>
             </a:fld>
             <a:endParaRPr lang="en-US" dirty="0"/>
           </a:p>
@@ -2318,7 +2325,7 @@
           <a:p>
             <a:fld id="{4EDE50D6-574B-40AF-946F-D52A04ADE379}" type="datetime1">
               <a:rPr lang="en-US" smtClean="0"/>
-              <a:t>6/16/2020</a:t>
+              <a:t>6/18/2020</a:t>
             </a:fld>
             <a:endParaRPr lang="en-US" dirty="0"/>
           </a:p>
@@ -2695,7 +2702,7 @@
           <a:p>
             <a:fld id="{D82884F1-FFEA-405F-9602-3DCA865EDA4E}" type="datetime1">
               <a:rPr lang="en-US" smtClean="0"/>
-              <a:t>6/16/2020</a:t>
+              <a:t>6/18/2020</a:t>
             </a:fld>
             <a:endParaRPr lang="en-US" dirty="0"/>
           </a:p>
@@ -2988,7 +2995,7 @@
           <a:p>
             <a:fld id="{7E18DB4A-8810-4A10-AD5C-D5E2C667F5B3}" type="datetime1">
               <a:rPr lang="en-US" smtClean="0"/>
-              <a:t>6/16/2020</a:t>
+              <a:t>6/18/2020</a:t>
             </a:fld>
             <a:endParaRPr lang="en-US" dirty="0"/>
           </a:p>
@@ -3203,7 +3210,7 @@
           <a:p>
             <a:fld id="{ED291B17-9318-49DB-B28B-6E5994AE9581}" type="datetime1">
               <a:rPr lang="en-US" smtClean="0"/>
-              <a:t>6/16/2020</a:t>
+              <a:t>6/18/2020</a:t>
             </a:fld>
             <a:endParaRPr lang="en-US" dirty="0"/>
           </a:p>
@@ -4176,7 +4183,7 @@
         <p:spPr>
           <a:xfrm>
             <a:off x="581193" y="1725781"/>
-            <a:ext cx="11029615" cy="2835985"/>
+            <a:ext cx="11029615" cy="4900306"/>
           </a:xfrm>
         </p:spPr>
         <p:txBody>
@@ -4194,7 +4201,7 @@
             <a:pPr lvl="1"/>
             <a:r>
               <a:rPr lang="en-US" sz="1800" dirty="0"/>
-              <a:t>Abstract</a:t>
+              <a:t>Abstract of paper</a:t>
             </a:r>
           </a:p>
           <a:p>
@@ -4208,14 +4215,14 @@
             <a:pPr lvl="1"/>
             <a:r>
               <a:rPr lang="en-US" sz="1800" dirty="0"/>
-              <a:t>Poster</a:t>
+              <a:t>Poster submission</a:t>
             </a:r>
           </a:p>
           <a:p>
             <a:pPr lvl="2"/>
             <a:r>
-              <a:rPr lang="en-US" sz="1800" dirty="0"/>
-              <a:t>Abstract made visual</a:t>
+              <a:rPr lang="en-US" sz="1700" dirty="0"/>
+              <a:t>Submitting an outline of your poster</a:t>
             </a:r>
           </a:p>
           <a:p>
@@ -4224,6 +4231,38 @@
               <a:rPr lang="en-US" sz="1800" dirty="0"/>
               <a:t>Poster Presentation</a:t>
             </a:r>
+          </a:p>
+          <a:p>
+            <a:pPr lvl="2"/>
+            <a:r>
+              <a:rPr lang="en-US" sz="1700" dirty="0"/>
+              <a:t>Introduction to your poster through program guide</a:t>
+            </a:r>
+          </a:p>
+          <a:p>
+            <a:pPr lvl="1"/>
+            <a:r>
+              <a:rPr lang="en-US" sz="1800" dirty="0"/>
+              <a:t>Oral Presentation</a:t>
+            </a:r>
+          </a:p>
+          <a:p>
+            <a:pPr lvl="2"/>
+            <a:r>
+              <a:rPr lang="en-US" sz="1700" dirty="0"/>
+              <a:t>Introduction to your talk and generate interest</a:t>
+            </a:r>
+          </a:p>
+          <a:p>
+            <a:pPr lvl="1"/>
+            <a:r>
+              <a:rPr lang="en-US" sz="1800" dirty="0"/>
+              <a:t>A way to synthesize your research to an intended audience</a:t>
+            </a:r>
+          </a:p>
+          <a:p>
+            <a:pPr lvl="1"/>
+            <a:endParaRPr lang="en-US" sz="1800" dirty="0"/>
           </a:p>
           <a:p>
             <a:pPr lvl="2"/>
@@ -4651,7 +4690,7 @@
           <a:p>
             <a:r>
               <a:rPr lang="en-US" sz="2000" dirty="0"/>
-              <a:t>Start drafting</a:t>
+              <a:t>Start drafting, involve your mentor</a:t>
             </a:r>
           </a:p>
           <a:p>
@@ -4766,7 +4805,7 @@
           <a:p>
             <a:r>
               <a:rPr lang="en-US" dirty="0"/>
-              <a:t>How to write an Abstract</a:t>
+              <a:t>ABRCMS Tips</a:t>
             </a:r>
           </a:p>
         </p:txBody>
@@ -4789,85 +4828,415 @@
         </p:nvSpPr>
         <p:spPr>
           <a:xfrm>
-            <a:off x="581192" y="1686187"/>
-            <a:ext cx="11029615" cy="4289163"/>
+            <a:off x="581192" y="1521759"/>
+            <a:ext cx="11029615" cy="5223598"/>
           </a:xfrm>
         </p:spPr>
         <p:txBody>
           <a:bodyPr>
-            <a:normAutofit lnSpcReduction="10000"/>
+            <a:normAutofit/>
           </a:bodyPr>
           <a:lstStyle/>
           <a:p>
             <a:r>
+              <a:rPr lang="en-US" b="1" dirty="0"/>
+              <a:t>1. READ </a:t>
+            </a:r>
+            <a:r>
+              <a:rPr lang="en-US" dirty="0"/>
+              <a:t>the instructions! Don’t waste energy doing the wrong thing. Familiarize yourself with the </a:t>
+            </a:r>
+            <a:r>
+              <a:rPr lang="en-US" dirty="0">
+                <a:hlinkClick r:id="rId2"/>
+              </a:rPr>
+              <a:t>requirements</a:t>
+            </a:r>
+            <a:r>
+              <a:rPr lang="en-US" dirty="0"/>
+              <a:t> for the ABRCMS Abstract submission process.</a:t>
+            </a:r>
+          </a:p>
+          <a:p>
+            <a:r>
+              <a:rPr lang="en-US" b="1" dirty="0"/>
+              <a:t>2.</a:t>
+            </a:r>
+            <a:r>
+              <a:rPr lang="en-US" dirty="0"/>
+              <a:t> Understand who is the </a:t>
+            </a:r>
+            <a:r>
+              <a:rPr lang="en-US" b="1" dirty="0"/>
+              <a:t>TARGET AUDIENCE</a:t>
+            </a:r>
+            <a:r>
+              <a:rPr lang="en-US" dirty="0"/>
+              <a:t> (or who you want to be your audience). This not a specialized journal that knows all of your jargon, so know that going in.</a:t>
+            </a:r>
+          </a:p>
+          <a:p>
+            <a:r>
+              <a:rPr lang="en-US" b="1" dirty="0"/>
+              <a:t>3.</a:t>
+            </a:r>
+            <a:r>
+              <a:rPr lang="en-US" dirty="0"/>
+              <a:t> Write your hypothesis/statement of purpose with </a:t>
+            </a:r>
+            <a:r>
+              <a:rPr lang="en-US" b="1" dirty="0"/>
+              <a:t>CLARITY</a:t>
+            </a:r>
+            <a:r>
+              <a:rPr lang="en-US" dirty="0"/>
+              <a:t>. An abstract allows the reader to learn a great deal about your work with very little effort. Even though every project won't have a hypothesis, you should always clearly indicate the intended purpose of your work.</a:t>
+            </a:r>
+          </a:p>
+          <a:p>
+            <a:r>
+              <a:rPr lang="en-US" b="1" dirty="0"/>
+              <a:t>4.</a:t>
+            </a:r>
+            <a:r>
+              <a:rPr lang="en-US" dirty="0"/>
+              <a:t> Make sure the results and conclusions </a:t>
+            </a:r>
+            <a:r>
+              <a:rPr lang="en-US" b="1" dirty="0"/>
+              <a:t>TIE BACK</a:t>
+            </a:r>
+            <a:r>
+              <a:rPr lang="en-US" dirty="0"/>
+              <a:t> to what you said in your hypothesis/statement of purpose. Think back to what you said the hypothesis/statement of purpose was. If your results and conclusions don't clearly support that, then you haven't done a good job showing reviewers that you are worthy to be selected.</a:t>
+            </a:r>
+          </a:p>
+          <a:p>
+            <a:r>
+              <a:rPr lang="en-US" b="1" dirty="0"/>
+              <a:t>5.</a:t>
+            </a:r>
+            <a:r>
+              <a:rPr lang="en-US" dirty="0"/>
+              <a:t> Give the abstract to multiple people (including your PI) to </a:t>
+            </a:r>
+            <a:r>
+              <a:rPr lang="en-US" b="1" dirty="0"/>
+              <a:t>REVIEW</a:t>
+            </a:r>
+            <a:r>
+              <a:rPr lang="en-US" dirty="0"/>
+              <a:t> it. We can't stress the importance of proofreading and review. The more eyes it sees, the better it will be!</a:t>
+            </a:r>
+          </a:p>
+          <a:p>
+            <a:endParaRPr lang="en-US" dirty="0"/>
+          </a:p>
+        </p:txBody>
+      </p:sp>
+    </p:spTree>
+    <p:extLst>
+      <p:ext uri="{BB962C8B-B14F-4D97-AF65-F5344CB8AC3E}">
+        <p14:creationId xmlns:p14="http://schemas.microsoft.com/office/powerpoint/2010/main" val="3525321017"/>
+      </p:ext>
+    </p:extLst>
+  </p:cSld>
+  <p:clrMapOvr>
+    <a:masterClrMapping/>
+  </p:clrMapOvr>
+</p:sld>
+</file>
+
+<file path=ppt/slides/slide7.xml><?xml version="1.0" encoding="utf-8"?>
+<p:sld xmlns:a="http://schemas.openxmlformats.org/drawingml/2006/main" xmlns:r="http://schemas.openxmlformats.org/officeDocument/2006/relationships" xmlns:p="http://schemas.openxmlformats.org/presentationml/2006/main">
+  <p:cSld>
+    <p:spTree>
+      <p:nvGrpSpPr>
+        <p:cNvPr id="1" name=""/>
+        <p:cNvGrpSpPr/>
+        <p:nvPr/>
+      </p:nvGrpSpPr>
+      <p:grpSpPr>
+        <a:xfrm>
+          <a:off x="0" y="0"/>
+          <a:ext cx="0" cy="0"/>
+          <a:chOff x="0" y="0"/>
+          <a:chExt cx="0" cy="0"/>
+        </a:xfrm>
+      </p:grpSpPr>
+      <p:sp>
+        <p:nvSpPr>
+          <p:cNvPr id="2" name="Title 1">
+            <a:extLst>
+              <a:ext uri="{FF2B5EF4-FFF2-40B4-BE49-F238E27FC236}">
+                <a16:creationId xmlns:a16="http://schemas.microsoft.com/office/drawing/2014/main" id="{8B53D179-DDB5-4C2E-B759-A6A7754C5CD4}"/>
+              </a:ext>
+            </a:extLst>
+          </p:cNvPr>
+          <p:cNvSpPr>
+            <a:spLocks noGrp="1"/>
+          </p:cNvSpPr>
+          <p:nvPr>
+            <p:ph type="title"/>
+          </p:nvPr>
+        </p:nvSpPr>
+        <p:spPr>
+          <a:xfrm>
+            <a:off x="581193" y="755008"/>
+            <a:ext cx="11029616" cy="766751"/>
+          </a:xfrm>
+        </p:spPr>
+        <p:txBody>
+          <a:bodyPr/>
+          <a:lstStyle/>
+          <a:p>
+            <a:r>
+              <a:rPr lang="en-US" dirty="0"/>
+              <a:t>How to Read an Abstract</a:t>
+            </a:r>
+          </a:p>
+        </p:txBody>
+      </p:sp>
+      <p:sp>
+        <p:nvSpPr>
+          <p:cNvPr id="8" name="Content Placeholder 7">
+            <a:extLst>
+              <a:ext uri="{FF2B5EF4-FFF2-40B4-BE49-F238E27FC236}">
+                <a16:creationId xmlns:a16="http://schemas.microsoft.com/office/drawing/2014/main" id="{50C2AE6C-A54F-4375-85C2-C6D803EE3B10}"/>
+              </a:ext>
+            </a:extLst>
+          </p:cNvPr>
+          <p:cNvSpPr>
+            <a:spLocks noGrp="1"/>
+          </p:cNvSpPr>
+          <p:nvPr>
+            <p:ph idx="1"/>
+          </p:nvPr>
+        </p:nvSpPr>
+        <p:spPr>
+          <a:xfrm>
+            <a:off x="581195" y="1584707"/>
+            <a:ext cx="4878702" cy="2649054"/>
+          </a:xfrm>
+        </p:spPr>
+        <p:txBody>
+          <a:bodyPr>
+            <a:normAutofit/>
+          </a:bodyPr>
+          <a:lstStyle/>
+          <a:p>
+            <a:r>
               <a:rPr lang="en-US" sz="2000" dirty="0"/>
-              <a:t>Word vomit</a:t>
-            </a:r>
-          </a:p>
-          <a:p>
-            <a:pPr lvl="1"/>
+              <a:t>Outline the big ideas of the paper</a:t>
+            </a:r>
+          </a:p>
+          <a:p>
+            <a:r>
+              <a:rPr lang="en-US" sz="2000" dirty="0"/>
+              <a:t>Guide you to certain sections</a:t>
+            </a:r>
+          </a:p>
+          <a:p>
+            <a:r>
+              <a:rPr lang="en-US" sz="2000" dirty="0"/>
+              <a:t>Keywords create quick concepts to identify and define</a:t>
+            </a:r>
+          </a:p>
+          <a:p>
+            <a:r>
+              <a:rPr lang="en-US" sz="2000" dirty="0"/>
+              <a:t>Big picture will be at the end</a:t>
+            </a:r>
+          </a:p>
+        </p:txBody>
+      </p:sp>
+    </p:spTree>
+    <p:extLst>
+      <p:ext uri="{BB962C8B-B14F-4D97-AF65-F5344CB8AC3E}">
+        <p14:creationId xmlns:p14="http://schemas.microsoft.com/office/powerpoint/2010/main" val="3059779591"/>
+      </p:ext>
+    </p:extLst>
+  </p:cSld>
+  <p:clrMapOvr>
+    <a:masterClrMapping/>
+  </p:clrMapOvr>
+</p:sld>
+</file>
+
+<file path=ppt/slides/slide8.xml><?xml version="1.0" encoding="utf-8"?>
+<p:sld xmlns:a="http://schemas.openxmlformats.org/drawingml/2006/main" xmlns:r="http://schemas.openxmlformats.org/officeDocument/2006/relationships" xmlns:p="http://schemas.openxmlformats.org/presentationml/2006/main">
+  <p:cSld>
+    <p:spTree>
+      <p:nvGrpSpPr>
+        <p:cNvPr id="1" name=""/>
+        <p:cNvGrpSpPr/>
+        <p:nvPr/>
+      </p:nvGrpSpPr>
+      <p:grpSpPr>
+        <a:xfrm>
+          <a:off x="0" y="0"/>
+          <a:ext cx="0" cy="0"/>
+          <a:chOff x="0" y="0"/>
+          <a:chExt cx="0" cy="0"/>
+        </a:xfrm>
+      </p:grpSpPr>
+      <p:sp>
+        <p:nvSpPr>
+          <p:cNvPr id="2" name="Title 1">
+            <a:extLst>
+              <a:ext uri="{FF2B5EF4-FFF2-40B4-BE49-F238E27FC236}">
+                <a16:creationId xmlns:a16="http://schemas.microsoft.com/office/drawing/2014/main" id="{8B53D179-DDB5-4C2E-B759-A6A7754C5CD4}"/>
+              </a:ext>
+            </a:extLst>
+          </p:cNvPr>
+          <p:cNvSpPr>
+            <a:spLocks noGrp="1"/>
+          </p:cNvSpPr>
+          <p:nvPr>
+            <p:ph type="title"/>
+          </p:nvPr>
+        </p:nvSpPr>
+        <p:spPr>
+          <a:xfrm>
+            <a:off x="581193" y="755008"/>
+            <a:ext cx="11029616" cy="766751"/>
+          </a:xfrm>
+        </p:spPr>
+        <p:txBody>
+          <a:bodyPr/>
+          <a:lstStyle/>
+          <a:p>
+            <a:r>
+              <a:rPr lang="en-US" dirty="0"/>
+              <a:t>Writing and reviewing Time</a:t>
+            </a:r>
+          </a:p>
+        </p:txBody>
+      </p:sp>
+      <p:sp>
+        <p:nvSpPr>
+          <p:cNvPr id="8" name="Content Placeholder 7">
+            <a:extLst>
+              <a:ext uri="{FF2B5EF4-FFF2-40B4-BE49-F238E27FC236}">
+                <a16:creationId xmlns:a16="http://schemas.microsoft.com/office/drawing/2014/main" id="{50C2AE6C-A54F-4375-85C2-C6D803EE3B10}"/>
+              </a:ext>
+            </a:extLst>
+          </p:cNvPr>
+          <p:cNvSpPr>
+            <a:spLocks noGrp="1"/>
+          </p:cNvSpPr>
+          <p:nvPr>
+            <p:ph idx="1"/>
+          </p:nvPr>
+        </p:nvSpPr>
+        <p:spPr>
+          <a:xfrm>
+            <a:off x="581192" y="1656521"/>
+            <a:ext cx="11029615" cy="4797288"/>
+          </a:xfrm>
+        </p:spPr>
+        <p:txBody>
+          <a:bodyPr>
+            <a:normAutofit/>
+          </a:bodyPr>
+          <a:lstStyle/>
+          <a:p>
+            <a:pPr marL="342900" indent="-342900">
+              <a:buAutoNum type="arabicParenR"/>
+            </a:pPr>
+            <a:r>
+              <a:rPr lang="en-US" sz="2000" dirty="0"/>
+              <a:t>Review abstracts in the </a:t>
+            </a:r>
+            <a:r>
+              <a:rPr lang="en-US" sz="2000" dirty="0">
+                <a:hlinkClick r:id="rId2"/>
+              </a:rPr>
+              <a:t>https://github.com/madmolecularman/MARC-Summer-2020</a:t>
+            </a:r>
+            <a:r>
+              <a:rPr lang="en-US" sz="2000" dirty="0"/>
+              <a:t> &gt; resources &gt; abstracts &gt; sample_abstracts.docx</a:t>
+            </a:r>
+          </a:p>
+          <a:p>
+            <a:pPr marL="666900" lvl="1" indent="-342900">
+              <a:buFont typeface="+mj-lt"/>
+              <a:buAutoNum type="alphaUcPeriod"/>
+            </a:pPr>
             <a:r>
               <a:rPr lang="en-US" sz="1800" dirty="0"/>
-              <a:t>Rule: Just write, don’t worry about making it perfect</a:t>
-            </a:r>
-          </a:p>
-          <a:p>
+              <a:t>Other examples there include</a:t>
+            </a:r>
+          </a:p>
+          <a:p>
+            <a:pPr marL="936900" lvl="2" indent="-342900">
+              <a:buFont typeface="+mj-lt"/>
+              <a:buAutoNum type="arabicPeriod"/>
+            </a:pPr>
+            <a:r>
+              <a:rPr lang="en-US" sz="1700" dirty="0"/>
+              <a:t>2017 Awardee Annotated Abstracts</a:t>
+            </a:r>
+          </a:p>
+          <a:p>
+            <a:pPr marL="936900" lvl="2" indent="-342900">
+              <a:buFont typeface="+mj-lt"/>
+              <a:buAutoNum type="arabicPeriod"/>
+            </a:pPr>
+            <a:r>
+              <a:rPr lang="en-US" sz="1700" dirty="0"/>
+              <a:t>ABRCMS sample abstracts</a:t>
+            </a:r>
+          </a:p>
+          <a:p>
+            <a:pPr marL="342900" indent="-342900">
+              <a:buAutoNum type="arabicParenR"/>
+            </a:pPr>
             <a:r>
               <a:rPr lang="en-US" sz="2000" dirty="0"/>
-              <a:t>Start drafting</a:t>
-            </a:r>
-          </a:p>
-          <a:p>
-            <a:r>
-              <a:rPr lang="en-US" sz="2000" dirty="0"/>
-              <a:t>Sections:</a:t>
-            </a:r>
-          </a:p>
-          <a:p>
-            <a:pPr lvl="1"/>
+              <a:t>Word vomit research motivation and methodology</a:t>
+            </a:r>
+          </a:p>
+          <a:p>
+            <a:pPr marL="666900" lvl="1" indent="-342900">
+              <a:buFont typeface="+mj-lt"/>
+              <a:buAutoNum type="alphaUcPeriod"/>
+            </a:pPr>
             <a:r>
               <a:rPr lang="en-US" sz="1800" dirty="0"/>
-              <a:t>Title</a:t>
-            </a:r>
-          </a:p>
-          <a:p>
-            <a:pPr lvl="1"/>
+              <a:t> Title</a:t>
+            </a:r>
+          </a:p>
+          <a:p>
+            <a:pPr marL="666900" lvl="1" indent="-342900">
+              <a:buFont typeface="+mj-lt"/>
+              <a:buAutoNum type="alphaUcPeriod"/>
+            </a:pPr>
             <a:r>
               <a:rPr lang="en-US" sz="1800" dirty="0"/>
-              <a:t>Why (introduction/ so what)</a:t>
-            </a:r>
-          </a:p>
-          <a:p>
-            <a:pPr lvl="1"/>
+              <a:t>Authors</a:t>
+            </a:r>
+          </a:p>
+          <a:p>
+            <a:pPr marL="666900" lvl="1" indent="-342900">
+              <a:buFont typeface="+mj-lt"/>
+              <a:buAutoNum type="alphaUcPeriod"/>
+            </a:pPr>
             <a:r>
               <a:rPr lang="en-US" sz="1800" dirty="0"/>
-              <a:t>Purpose (problem/ goal/ research question)</a:t>
-            </a:r>
-          </a:p>
-          <a:p>
-            <a:pPr lvl="1"/>
+              <a:t>Purpose/introduction</a:t>
+            </a:r>
+          </a:p>
+          <a:p>
+            <a:pPr marL="666900" lvl="1" indent="-342900">
+              <a:buFont typeface="+mj-lt"/>
+              <a:buAutoNum type="alphaUcPeriod"/>
+            </a:pPr>
             <a:r>
               <a:rPr lang="en-US" sz="1800" dirty="0"/>
-              <a:t>How (methodology)</a:t>
-            </a:r>
-          </a:p>
-          <a:p>
-            <a:pPr lvl="1"/>
-            <a:r>
-              <a:rPr lang="en-US" sz="1800" dirty="0"/>
-              <a:t>What (results)</a:t>
-            </a:r>
-          </a:p>
-          <a:p>
-            <a:pPr lvl="1"/>
-            <a:r>
-              <a:rPr lang="en-US" sz="1800" dirty="0"/>
-              <a:t>Conclusion/significance (broader impacts)</a:t>
-            </a:r>
-            <a:endParaRPr lang="en-US" dirty="0"/>
-          </a:p>
-          <a:p>
-            <a:endParaRPr lang="en-US" dirty="0"/>
+              <a:t>Methodology</a:t>
+            </a:r>
           </a:p>
         </p:txBody>
       </p:sp>

</xml_diff>